<commit_message>
added QR code to poster! please work
</commit_message>
<xml_diff>
--- a/files/Chiu_ASA_2022.pptx
+++ b/files/Chiu_ASA_2022.pptx
@@ -2132,7 +2132,7 @@
           <a:p>
             <a:fld id="{705557F2-5FDF-4B12-B599-55569092FA54}" type="datetimeFigureOut">
               <a:rPr lang="en-US" smtClean="0"/>
-              <a:t>11/30/2022</a:t>
+              <a:t>12/1/2022</a:t>
             </a:fld>
             <a:endParaRPr lang="en-US"/>
           </a:p>
@@ -3229,7 +3229,7 @@
             <a:fld id="{806AC2E7-7D05-FC4A-9DD7-FD1620ACD022}" type="datetimeFigureOut">
               <a:rPr lang="en-US"/>
               <a:pPr/>
-              <a:t>11/30/2022</a:t>
+              <a:t>12/1/2022</a:t>
             </a:fld>
             <a:endParaRPr lang="en-US"/>
           </a:p>
@@ -3434,7 +3434,7 @@
             <a:fld id="{806AC2E7-7D05-FC4A-9DD7-FD1620ACD022}" type="datetimeFigureOut">
               <a:rPr lang="en-US"/>
               <a:pPr/>
-              <a:t>11/30/2022</a:t>
+              <a:t>12/1/2022</a:t>
             </a:fld>
             <a:endParaRPr lang="en-US"/>
           </a:p>
@@ -3639,7 +3639,7 @@
             <a:fld id="{806AC2E7-7D05-FC4A-9DD7-FD1620ACD022}" type="datetimeFigureOut">
               <a:rPr lang="en-US"/>
               <a:pPr/>
-              <a:t>11/30/2022</a:t>
+              <a:t>12/1/2022</a:t>
             </a:fld>
             <a:endParaRPr lang="en-US"/>
           </a:p>
@@ -3844,7 +3844,7 @@
             <a:fld id="{806AC2E7-7D05-FC4A-9DD7-FD1620ACD022}" type="datetimeFigureOut">
               <a:rPr lang="en-US"/>
               <a:pPr/>
-              <a:t>11/30/2022</a:t>
+              <a:t>12/1/2022</a:t>
             </a:fld>
             <a:endParaRPr lang="en-US"/>
           </a:p>
@@ -4116,7 +4116,7 @@
             <a:fld id="{806AC2E7-7D05-FC4A-9DD7-FD1620ACD022}" type="datetimeFigureOut">
               <a:rPr lang="en-US"/>
               <a:pPr/>
-              <a:t>11/30/2022</a:t>
+              <a:t>12/1/2022</a:t>
             </a:fld>
             <a:endParaRPr lang="en-US"/>
           </a:p>
@@ -4436,7 +4436,7 @@
             <a:fld id="{806AC2E7-7D05-FC4A-9DD7-FD1620ACD022}" type="datetimeFigureOut">
               <a:rPr lang="en-US"/>
               <a:pPr/>
-              <a:t>11/30/2022</a:t>
+              <a:t>12/1/2022</a:t>
             </a:fld>
             <a:endParaRPr lang="en-US"/>
           </a:p>
@@ -4896,7 +4896,7 @@
             <a:fld id="{806AC2E7-7D05-FC4A-9DD7-FD1620ACD022}" type="datetimeFigureOut">
               <a:rPr lang="en-US"/>
               <a:pPr/>
-              <a:t>11/30/2022</a:t>
+              <a:t>12/1/2022</a:t>
             </a:fld>
             <a:endParaRPr lang="en-US"/>
           </a:p>
@@ -5042,7 +5042,7 @@
             <a:fld id="{806AC2E7-7D05-FC4A-9DD7-FD1620ACD022}" type="datetimeFigureOut">
               <a:rPr lang="en-US"/>
               <a:pPr/>
-              <a:t>11/30/2022</a:t>
+              <a:t>12/1/2022</a:t>
             </a:fld>
             <a:endParaRPr lang="en-US"/>
           </a:p>
@@ -5158,7 +5158,7 @@
             <a:fld id="{806AC2E7-7D05-FC4A-9DD7-FD1620ACD022}" type="datetimeFigureOut">
               <a:rPr lang="en-US"/>
               <a:pPr/>
-              <a:t>11/30/2022</a:t>
+              <a:t>12/1/2022</a:t>
             </a:fld>
             <a:endParaRPr lang="en-US"/>
           </a:p>
@@ -5463,7 +5463,7 @@
             <a:fld id="{806AC2E7-7D05-FC4A-9DD7-FD1620ACD022}" type="datetimeFigureOut">
               <a:rPr lang="en-US"/>
               <a:pPr/>
-              <a:t>11/30/2022</a:t>
+              <a:t>12/1/2022</a:t>
             </a:fld>
             <a:endParaRPr lang="en-US"/>
           </a:p>
@@ -5745,7 +5745,7 @@
             <a:fld id="{806AC2E7-7D05-FC4A-9DD7-FD1620ACD022}" type="datetimeFigureOut">
               <a:rPr lang="en-US"/>
               <a:pPr/>
-              <a:t>11/30/2022</a:t>
+              <a:t>12/1/2022</a:t>
             </a:fld>
             <a:endParaRPr lang="en-US"/>
           </a:p>
@@ -51686,6 +51686,36 @@
           </p:sp>
         </p:grpSp>
       </p:grpSp>
+      <p:pic>
+        <p:nvPicPr>
+          <p:cNvPr id="19" name="Picture 18">
+            <a:extLst>
+              <a:ext uri="{FF2B5EF4-FFF2-40B4-BE49-F238E27FC236}">
+                <a16:creationId xmlns:a16="http://schemas.microsoft.com/office/drawing/2014/main" id="{E9F68CA3-254F-6B98-4C8A-9194A9B257D8}"/>
+              </a:ext>
+            </a:extLst>
+          </p:cNvPr>
+          <p:cNvPicPr>
+            <a:picLocks noChangeAspect="1"/>
+          </p:cNvPicPr>
+          <p:nvPr/>
+        </p:nvPicPr>
+        <p:blipFill>
+          <a:blip r:embed="rId23"/>
+          <a:stretch>
+            <a:fillRect/>
+          </a:stretch>
+        </p:blipFill>
+        <p:spPr>
+          <a:xfrm>
+            <a:off x="25664466" y="1868837"/>
+            <a:ext cx="1216714" cy="1216714"/>
+          </a:xfrm>
+          <a:prstGeom prst="rect">
+            <a:avLst/>
+          </a:prstGeom>
+        </p:spPr>
+      </p:pic>
     </p:spTree>
   </p:cSld>
   <p:clrMapOvr>

</xml_diff>

<commit_message>
I SPELLED IT WRONG
</commit_message>
<xml_diff>
--- a/files/Chiu_ASA_2022.pptx
+++ b/files/Chiu_ASA_2022.pptx
@@ -2027,27 +2027,6 @@
     </cs:spPr>
   </cs:wall>
 </cs:chartStyle>
-</file>
-
-<file path=ppt/comments/modernComment_100_0.xml><?xml version="1.0" encoding="utf-8"?>
-<p188:cmLst xmlns:a="http://schemas.openxmlformats.org/drawingml/2006/main" xmlns:r="http://schemas.openxmlformats.org/officeDocument/2006/relationships" xmlns:p188="http://schemas.microsoft.com/office/powerpoint/2018/8/main">
-  <p188:cm id="{25643379-8606-4B29-9AF4-F8552789CB04}" authorId="{A80BF495-82C8-9735-0053-EABA57DA7FE4}" created="2022-11-22T16:27:50.090">
-    <pc:sldMkLst xmlns:pc="http://schemas.microsoft.com/office/powerpoint/2013/main/command">
-      <pc:docMk/>
-      <pc:sldMk cId="0" sldId="256"/>
-    </pc:sldMkLst>
-    <p188:txBody>
-      <a:bodyPr/>
-      <a:lstStyle/>
-      <a:p>
-        <a:r>
-          <a:rPr lang="en-US"/>
-          <a:t>VOT distributions: change it to step </a:t>
-        </a:r>
-      </a:p>
-    </p188:txBody>
-  </p188:cm>
-</p188:cmLst>
 </file>
 
 <file path=ppt/notesMasters/notesMaster1.xml><?xml version="1.0" encoding="utf-8"?>
@@ -7001,7 +6980,7 @@
           <p:nvPr/>
         </p:nvPicPr>
         <p:blipFill>
-          <a:blip r:embed="rId4"/>
+          <a:blip r:embed="rId3"/>
           <a:stretch>
             <a:fillRect/>
           </a:stretch>
@@ -7311,13 +7290,13 @@
             <p:nvPr/>
           </p:nvPicPr>
           <p:blipFill>
-            <a:blip r:embed="rId5">
+            <a:blip r:embed="rId4">
               <a:extLst>
                 <a:ext uri="{28A0092B-C50C-407E-A947-70E740481C1C}">
                   <a14:useLocalDpi xmlns:a14="http://schemas.microsoft.com/office/drawing/2010/main" val="0"/>
                 </a:ext>
                 <a:ext uri="{96DAC541-7B7A-43D3-8B79-37D633B846F1}">
-                  <asvg:svgBlip xmlns:asvg="http://schemas.microsoft.com/office/drawing/2016/SVG/main" r:embed="rId6"/>
+                  <asvg:svgBlip xmlns:asvg="http://schemas.microsoft.com/office/drawing/2016/SVG/main" r:embed="rId5"/>
                 </a:ext>
               </a:extLst>
             </a:blip>
@@ -7350,13 +7329,13 @@
             <p:nvPr/>
           </p:nvPicPr>
           <p:blipFill>
-            <a:blip r:embed="rId7">
+            <a:blip r:embed="rId6">
               <a:extLst>
                 <a:ext uri="{28A0092B-C50C-407E-A947-70E740481C1C}">
                   <a14:useLocalDpi xmlns:a14="http://schemas.microsoft.com/office/drawing/2010/main" val="0"/>
                 </a:ext>
                 <a:ext uri="{96DAC541-7B7A-43D3-8B79-37D633B846F1}">
-                  <asvg:svgBlip xmlns:asvg="http://schemas.microsoft.com/office/drawing/2016/SVG/main" r:embed="rId8"/>
+                  <asvg:svgBlip xmlns:asvg="http://schemas.microsoft.com/office/drawing/2016/SVG/main" r:embed="rId7"/>
                 </a:ext>
               </a:extLst>
             </a:blip>
@@ -7659,10 +7638,10 @@
             <p:nvPr/>
           </p:nvPicPr>
           <p:blipFill>
-            <a:blip r:embed="rId9">
+            <a:blip r:embed="rId8">
               <a:extLst>
                 <a:ext uri="{96DAC541-7B7A-43D3-8B79-37D633B846F1}">
-                  <asvg:svgBlip xmlns:asvg="http://schemas.microsoft.com/office/drawing/2016/SVG/main" r:embed="rId10"/>
+                  <asvg:svgBlip xmlns:asvg="http://schemas.microsoft.com/office/drawing/2016/SVG/main" r:embed="rId9"/>
                 </a:ext>
               </a:extLst>
             </a:blip>
@@ -7694,10 +7673,10 @@
             <p:nvPr/>
           </p:nvPicPr>
           <p:blipFill>
-            <a:blip r:embed="rId11">
+            <a:blip r:embed="rId10">
               <a:extLst>
                 <a:ext uri="{96DAC541-7B7A-43D3-8B79-37D633B846F1}">
-                  <asvg:svgBlip xmlns:asvg="http://schemas.microsoft.com/office/drawing/2016/SVG/main" r:embed="rId12"/>
+                  <asvg:svgBlip xmlns:asvg="http://schemas.microsoft.com/office/drawing/2016/SVG/main" r:embed="rId11"/>
                 </a:ext>
               </a:extLst>
             </a:blip>
@@ -7891,13 +7870,13 @@
             <p:nvPr/>
           </p:nvPicPr>
           <p:blipFill>
-            <a:blip r:embed="rId11">
+            <a:blip r:embed="rId10">
               <a:extLst>
                 <a:ext uri="{28A0092B-C50C-407E-A947-70E740481C1C}">
                   <a14:useLocalDpi xmlns:a14="http://schemas.microsoft.com/office/drawing/2010/main" val="0"/>
                 </a:ext>
                 <a:ext uri="{96DAC541-7B7A-43D3-8B79-37D633B846F1}">
-                  <asvg:svgBlip xmlns:asvg="http://schemas.microsoft.com/office/drawing/2016/SVG/main" r:embed="rId12"/>
+                  <asvg:svgBlip xmlns:asvg="http://schemas.microsoft.com/office/drawing/2016/SVG/main" r:embed="rId11"/>
                 </a:ext>
               </a:extLst>
             </a:blip>
@@ -7930,13 +7909,13 @@
             <p:nvPr/>
           </p:nvPicPr>
           <p:blipFill>
-            <a:blip r:embed="rId9">
+            <a:blip r:embed="rId8">
               <a:extLst>
                 <a:ext uri="{28A0092B-C50C-407E-A947-70E740481C1C}">
                   <a14:useLocalDpi xmlns:a14="http://schemas.microsoft.com/office/drawing/2010/main" val="0"/>
                 </a:ext>
                 <a:ext uri="{96DAC541-7B7A-43D3-8B79-37D633B846F1}">
-                  <asvg:svgBlip xmlns:asvg="http://schemas.microsoft.com/office/drawing/2016/SVG/main" r:embed="rId10"/>
+                  <asvg:svgBlip xmlns:asvg="http://schemas.microsoft.com/office/drawing/2016/SVG/main" r:embed="rId9"/>
                 </a:ext>
               </a:extLst>
             </a:blip>
@@ -8132,10 +8111,10 @@
             <p:nvPr/>
           </p:nvPicPr>
           <p:blipFill>
-            <a:blip r:embed="rId7">
+            <a:blip r:embed="rId6">
               <a:extLst>
                 <a:ext uri="{96DAC541-7B7A-43D3-8B79-37D633B846F1}">
-                  <asvg:svgBlip xmlns:asvg="http://schemas.microsoft.com/office/drawing/2016/SVG/main" r:embed="rId8"/>
+                  <asvg:svgBlip xmlns:asvg="http://schemas.microsoft.com/office/drawing/2016/SVG/main" r:embed="rId7"/>
                 </a:ext>
               </a:extLst>
             </a:blip>
@@ -8167,10 +8146,10 @@
             <p:nvPr/>
           </p:nvPicPr>
           <p:blipFill>
-            <a:blip r:embed="rId13">
+            <a:blip r:embed="rId12">
               <a:extLst>
                 <a:ext uri="{96DAC541-7B7A-43D3-8B79-37D633B846F1}">
-                  <asvg:svgBlip xmlns:asvg="http://schemas.microsoft.com/office/drawing/2016/SVG/main" r:embed="rId14"/>
+                  <asvg:svgBlip xmlns:asvg="http://schemas.microsoft.com/office/drawing/2016/SVG/main" r:embed="rId13"/>
                 </a:ext>
               </a:extLst>
             </a:blip>
@@ -8648,7 +8627,7 @@
           </p:xfrm>
           <a:graphic>
             <a:graphicData uri="http://schemas.openxmlformats.org/drawingml/2006/chart">
-              <c:chart xmlns:c="http://schemas.openxmlformats.org/drawingml/2006/chart" xmlns:r="http://schemas.openxmlformats.org/officeDocument/2006/relationships" r:id="rId15"/>
+              <c:chart xmlns:c="http://schemas.openxmlformats.org/drawingml/2006/chart" xmlns:r="http://schemas.openxmlformats.org/officeDocument/2006/relationships" r:id="rId14"/>
             </a:graphicData>
           </a:graphic>
         </p:graphicFrame>
@@ -8782,7 +8761,7 @@
           </p:xfrm>
           <a:graphic>
             <a:graphicData uri="http://schemas.openxmlformats.org/drawingml/2006/chart">
-              <c:chart xmlns:c="http://schemas.openxmlformats.org/drawingml/2006/chart" xmlns:r="http://schemas.openxmlformats.org/officeDocument/2006/relationships" r:id="rId16"/>
+              <c:chart xmlns:c="http://schemas.openxmlformats.org/drawingml/2006/chart" xmlns:r="http://schemas.openxmlformats.org/officeDocument/2006/relationships" r:id="rId15"/>
             </a:graphicData>
           </a:graphic>
         </p:graphicFrame>
@@ -40103,13 +40082,13 @@
             <p:nvPr/>
           </p:nvPicPr>
           <p:blipFill>
-            <a:blip r:embed="rId17">
+            <a:blip r:embed="rId16">
               <a:extLst>
                 <a:ext uri="{28A0092B-C50C-407E-A947-70E740481C1C}">
                   <a14:useLocalDpi xmlns:a14="http://schemas.microsoft.com/office/drawing/2010/main" val="0"/>
                 </a:ext>
                 <a:ext uri="{96DAC541-7B7A-43D3-8B79-37D633B846F1}">
-                  <asvg:svgBlip xmlns:asvg="http://schemas.microsoft.com/office/drawing/2016/SVG/main" r:embed="rId18"/>
+                  <asvg:svgBlip xmlns:asvg="http://schemas.microsoft.com/office/drawing/2016/SVG/main" r:embed="rId17"/>
                 </a:ext>
               </a:extLst>
             </a:blip>
@@ -40142,13 +40121,13 @@
             <p:nvPr/>
           </p:nvPicPr>
           <p:blipFill>
-            <a:blip r:embed="rId19">
+            <a:blip r:embed="rId18">
               <a:extLst>
                 <a:ext uri="{28A0092B-C50C-407E-A947-70E740481C1C}">
                   <a14:useLocalDpi xmlns:a14="http://schemas.microsoft.com/office/drawing/2010/main" val="0"/>
                 </a:ext>
                 <a:ext uri="{96DAC541-7B7A-43D3-8B79-37D633B846F1}">
-                  <asvg:svgBlip xmlns:asvg="http://schemas.microsoft.com/office/drawing/2016/SVG/main" r:embed="rId20"/>
+                  <asvg:svgBlip xmlns:asvg="http://schemas.microsoft.com/office/drawing/2016/SVG/main" r:embed="rId19"/>
                 </a:ext>
               </a:extLst>
             </a:blip>
@@ -51192,13 +51171,13 @@
                 <p:nvPr/>
               </p:nvPicPr>
               <p:blipFill>
-                <a:blip r:embed="rId11">
+                <a:blip r:embed="rId10">
                   <a:extLst>
                     <a:ext uri="{28A0092B-C50C-407E-A947-70E740481C1C}">
                       <a14:useLocalDpi xmlns:a14="http://schemas.microsoft.com/office/drawing/2010/main" val="0"/>
                     </a:ext>
                     <a:ext uri="{96DAC541-7B7A-43D3-8B79-37D633B846F1}">
-                      <asvg:svgBlip xmlns:asvg="http://schemas.microsoft.com/office/drawing/2016/SVG/main" r:embed="rId12"/>
+                      <asvg:svgBlip xmlns:asvg="http://schemas.microsoft.com/office/drawing/2016/SVG/main" r:embed="rId11"/>
                     </a:ext>
                   </a:extLst>
                 </a:blip>
@@ -51279,13 +51258,13 @@
                 <p:nvPr/>
               </p:nvPicPr>
               <p:blipFill>
-                <a:blip r:embed="rId21">
+                <a:blip r:embed="rId20">
                   <a:extLst>
                     <a:ext uri="{28A0092B-C50C-407E-A947-70E740481C1C}">
                       <a14:useLocalDpi xmlns:a14="http://schemas.microsoft.com/office/drawing/2010/main" val="0"/>
                     </a:ext>
                     <a:ext uri="{96DAC541-7B7A-43D3-8B79-37D633B846F1}">
-                      <asvg:svgBlip xmlns:asvg="http://schemas.microsoft.com/office/drawing/2016/SVG/main" r:embed="rId22"/>
+                      <asvg:svgBlip xmlns:asvg="http://schemas.microsoft.com/office/drawing/2016/SVG/main" r:embed="rId21"/>
                     </a:ext>
                   </a:extLst>
                 </a:blip>
@@ -51466,13 +51445,13 @@
                 <p:nvPr/>
               </p:nvPicPr>
               <p:blipFill>
-                <a:blip r:embed="rId7">
+                <a:blip r:embed="rId6">
                   <a:extLst>
                     <a:ext uri="{28A0092B-C50C-407E-A947-70E740481C1C}">
                       <a14:useLocalDpi xmlns:a14="http://schemas.microsoft.com/office/drawing/2010/main" val="0"/>
                     </a:ext>
                     <a:ext uri="{96DAC541-7B7A-43D3-8B79-37D633B846F1}">
-                      <asvg:svgBlip xmlns:asvg="http://schemas.microsoft.com/office/drawing/2016/SVG/main" r:embed="rId8"/>
+                      <asvg:svgBlip xmlns:asvg="http://schemas.microsoft.com/office/drawing/2016/SVG/main" r:embed="rId7"/>
                     </a:ext>
                   </a:extLst>
                 </a:blip>
@@ -51553,13 +51532,13 @@
                 <p:nvPr/>
               </p:nvPicPr>
               <p:blipFill>
-                <a:blip r:embed="rId5">
+                <a:blip r:embed="rId4">
                   <a:extLst>
                     <a:ext uri="{28A0092B-C50C-407E-A947-70E740481C1C}">
                       <a14:useLocalDpi xmlns:a14="http://schemas.microsoft.com/office/drawing/2010/main" val="0"/>
                     </a:ext>
                     <a:ext uri="{96DAC541-7B7A-43D3-8B79-37D633B846F1}">
-                      <asvg:svgBlip xmlns:asvg="http://schemas.microsoft.com/office/drawing/2016/SVG/main" r:embed="rId6"/>
+                      <asvg:svgBlip xmlns:asvg="http://schemas.microsoft.com/office/drawing/2016/SVG/main" r:embed="rId5"/>
                     </a:ext>
                   </a:extLst>
                 </a:blip>
@@ -51701,7 +51680,7 @@
           <p:nvPr/>
         </p:nvPicPr>
         <p:blipFill>
-          <a:blip r:embed="rId23"/>
+          <a:blip r:embed="rId22"/>
           <a:stretch>
             <a:fillRect/>
           </a:stretch>
@@ -51721,11 +51700,6 @@
   <p:clrMapOvr>
     <a:masterClrMapping/>
   </p:clrMapOvr>
-  <p:extLst>
-    <p:ext uri="{6950BFC3-D8DA-4A85-94F7-54DA5524770B}">
-      <p188:commentRel xmlns:p188="http://schemas.microsoft.com/office/powerpoint/2018/8/main" r:id="rId3"/>
-    </p:ext>
-  </p:extLst>
 </p:sld>
 </file>
 

</xml_diff>